<commit_message>
fixed backend to accommodate company img
</commit_message>
<xml_diff>
--- a/docs/demonstracao-progresso.pptx
+++ b/docs/demonstracao-progresso.pptx
@@ -115,6 +115,11 @@
       </a:defRPr>
     </a:lvl9pPr>
   </p:defaultTextStyle>
+  <p:extLst>
+    <p:ext uri="{EFAFB233-063F-42B5-8137-9DF3F51BA10A}">
+      <p15:sldGuideLst xmlns:p15="http://schemas.microsoft.com/office/powerpoint/2012/main"/>
+    </p:ext>
+  </p:extLst>
 </p:presentation>
 </file>
 
@@ -319,7 +324,7 @@
           <a:p>
             <a:fld id="{834E4636-1AC7-4593-8425-9A7E3B693646}" type="slidenum">
               <a:rPr lang="pt-PT" smtClean="0"/>
-              <a:t>‹nº›</a:t>
+              <a:t>‹#›</a:t>
             </a:fld>
             <a:endParaRPr lang="pt-PT"/>
           </a:p>
@@ -517,7 +522,7 @@
           <a:p>
             <a:fld id="{834E4636-1AC7-4593-8425-9A7E3B693646}" type="slidenum">
               <a:rPr lang="pt-PT" smtClean="0"/>
-              <a:t>‹nº›</a:t>
+              <a:t>‹#›</a:t>
             </a:fld>
             <a:endParaRPr lang="pt-PT"/>
           </a:p>
@@ -725,7 +730,7 @@
           <a:p>
             <a:fld id="{834E4636-1AC7-4593-8425-9A7E3B693646}" type="slidenum">
               <a:rPr lang="pt-PT" smtClean="0"/>
-              <a:t>‹nº›</a:t>
+              <a:t>‹#›</a:t>
             </a:fld>
             <a:endParaRPr lang="pt-PT"/>
           </a:p>
@@ -923,7 +928,7 @@
           <a:p>
             <a:fld id="{834E4636-1AC7-4593-8425-9A7E3B693646}" type="slidenum">
               <a:rPr lang="pt-PT" smtClean="0"/>
-              <a:t>‹nº›</a:t>
+              <a:t>‹#›</a:t>
             </a:fld>
             <a:endParaRPr lang="pt-PT"/>
           </a:p>
@@ -1198,7 +1203,7 @@
           <a:p>
             <a:fld id="{834E4636-1AC7-4593-8425-9A7E3B693646}" type="slidenum">
               <a:rPr lang="pt-PT" smtClean="0"/>
-              <a:t>‹nº›</a:t>
+              <a:t>‹#›</a:t>
             </a:fld>
             <a:endParaRPr lang="pt-PT"/>
           </a:p>
@@ -1463,7 +1468,7 @@
           <a:p>
             <a:fld id="{834E4636-1AC7-4593-8425-9A7E3B693646}" type="slidenum">
               <a:rPr lang="pt-PT" smtClean="0"/>
-              <a:t>‹nº›</a:t>
+              <a:t>‹#›</a:t>
             </a:fld>
             <a:endParaRPr lang="pt-PT"/>
           </a:p>
@@ -1875,7 +1880,7 @@
           <a:p>
             <a:fld id="{834E4636-1AC7-4593-8425-9A7E3B693646}" type="slidenum">
               <a:rPr lang="pt-PT" smtClean="0"/>
-              <a:t>‹nº›</a:t>
+              <a:t>‹#›</a:t>
             </a:fld>
             <a:endParaRPr lang="pt-PT"/>
           </a:p>
@@ -2016,7 +2021,7 @@
           <a:p>
             <a:fld id="{834E4636-1AC7-4593-8425-9A7E3B693646}" type="slidenum">
               <a:rPr lang="pt-PT" smtClean="0"/>
-              <a:t>‹nº›</a:t>
+              <a:t>‹#›</a:t>
             </a:fld>
             <a:endParaRPr lang="pt-PT"/>
           </a:p>
@@ -2129,7 +2134,7 @@
           <a:p>
             <a:fld id="{834E4636-1AC7-4593-8425-9A7E3B693646}" type="slidenum">
               <a:rPr lang="pt-PT" smtClean="0"/>
-              <a:t>‹nº›</a:t>
+              <a:t>‹#›</a:t>
             </a:fld>
             <a:endParaRPr lang="pt-PT"/>
           </a:p>
@@ -2440,7 +2445,7 @@
           <a:p>
             <a:fld id="{834E4636-1AC7-4593-8425-9A7E3B693646}" type="slidenum">
               <a:rPr lang="pt-PT" smtClean="0"/>
-              <a:t>‹nº›</a:t>
+              <a:t>‹#›</a:t>
             </a:fld>
             <a:endParaRPr lang="pt-PT"/>
           </a:p>
@@ -2728,7 +2733,7 @@
           <a:p>
             <a:fld id="{834E4636-1AC7-4593-8425-9A7E3B693646}" type="slidenum">
               <a:rPr lang="pt-PT" smtClean="0"/>
-              <a:t>‹nº›</a:t>
+              <a:t>‹#›</a:t>
             </a:fld>
             <a:endParaRPr lang="pt-PT"/>
           </a:p>
@@ -3005,7 +3010,7 @@
           <a:p>
             <a:fld id="{834E4636-1AC7-4593-8425-9A7E3B693646}" type="slidenum">
               <a:rPr lang="pt-PT" smtClean="0"/>
-              <a:t>‹nº›</a:t>
+              <a:t>‹#›</a:t>
             </a:fld>
             <a:endParaRPr lang="pt-PT"/>
           </a:p>
@@ -3702,95 +3707,124 @@
         </p:nvSpPr>
         <p:spPr>
           <a:xfrm>
-            <a:off x="217996" y="1163637"/>
+            <a:off x="217996" y="1280178"/>
             <a:ext cx="10116457" cy="4881563"/>
           </a:xfrm>
         </p:spPr>
         <p:txBody>
           <a:bodyPr>
-            <a:normAutofit lnSpcReduction="10000"/>
+            <a:normAutofit fontScale="92500" lnSpcReduction="10000"/>
           </a:bodyPr>
           <a:lstStyle/>
           <a:p>
-            <a:pPr algn="l"/>
+            <a:pPr marL="342900" indent="-342900" algn="l">
+              <a:lnSpc>
+                <a:spcPct val="110000"/>
+              </a:lnSpc>
+              <a:buFont typeface="Arial" panose="020B0604020202020204" pitchFamily="34" charset="0"/>
+              <a:buChar char="•"/>
+            </a:pPr>
             <a:r>
               <a:rPr lang="pt-PT" dirty="0"/>
               <a:t>Trabalho realizado</a:t>
             </a:r>
           </a:p>
           <a:p>
-            <a:pPr algn="l"/>
+            <a:pPr algn="l">
+              <a:lnSpc>
+                <a:spcPct val="110000"/>
+              </a:lnSpc>
+            </a:pPr>
             <a:r>
               <a:rPr lang="pt-PT" dirty="0"/>
               <a:t>	Versão base da aplicação servidora</a:t>
             </a:r>
           </a:p>
           <a:p>
-            <a:pPr algn="l"/>
+            <a:pPr algn="l">
+              <a:lnSpc>
+                <a:spcPct val="110000"/>
+              </a:lnSpc>
+            </a:pPr>
             <a:r>
               <a:rPr lang="pt-PT" dirty="0"/>
               <a:t>	Documentação da API</a:t>
             </a:r>
           </a:p>
           <a:p>
-            <a:pPr algn="l"/>
+            <a:pPr algn="l">
+              <a:lnSpc>
+                <a:spcPct val="110000"/>
+              </a:lnSpc>
+            </a:pPr>
             <a:r>
               <a:rPr lang="pt-PT" dirty="0"/>
               <a:t>	Autenticação</a:t>
             </a:r>
           </a:p>
           <a:p>
-            <a:pPr algn="l"/>
-            <a:r>
-              <a:rPr lang="pt-PT" dirty="0"/>
-              <a:t>	</a:t>
-            </a:r>
-            <a:r>
-              <a:rPr lang="pt-PT" dirty="0" err="1"/>
-              <a:t>Deploy</a:t>
-            </a:r>
-            <a:r>
-              <a:rPr lang="pt-PT" dirty="0"/>
-              <a:t> da versão demo do cliente web</a:t>
-            </a:r>
-          </a:p>
-          <a:p>
-            <a:pPr algn="l"/>
+            <a:pPr algn="l">
+              <a:lnSpc>
+                <a:spcPct val="110000"/>
+              </a:lnSpc>
+            </a:pPr>
             <a:r>
               <a:rPr lang="pt-PT" dirty="0"/>
               <a:t>	Testes unitários e de integração</a:t>
             </a:r>
           </a:p>
           <a:p>
-            <a:pPr algn="l"/>
+            <a:pPr marL="342900" indent="-342900" algn="l">
+              <a:lnSpc>
+                <a:spcPct val="110000"/>
+              </a:lnSpc>
+              <a:buFont typeface="Arial" panose="020B0604020202020204" pitchFamily="34" charset="0"/>
+              <a:buChar char="•"/>
+            </a:pPr>
             <a:r>
               <a:rPr lang="pt-PT" dirty="0"/>
               <a:t>Trabalho a realizar</a:t>
             </a:r>
           </a:p>
           <a:p>
-            <a:pPr algn="l"/>
+            <a:pPr algn="l">
+              <a:lnSpc>
+                <a:spcPct val="110000"/>
+              </a:lnSpc>
+            </a:pPr>
             <a:r>
               <a:rPr lang="pt-PT" dirty="0"/>
               <a:t>	Adicionar novas funcionalidades à API</a:t>
             </a:r>
           </a:p>
           <a:p>
-            <a:pPr algn="l"/>
+            <a:pPr algn="l">
+              <a:lnSpc>
+                <a:spcPct val="110000"/>
+              </a:lnSpc>
+            </a:pPr>
             <a:r>
               <a:rPr lang="pt-PT" dirty="0"/>
               <a:t>	Concluir o cliente web de modo a utilizar as novas funcionalidades</a:t>
             </a:r>
           </a:p>
           <a:p>
-            <a:pPr algn="l"/>
+            <a:pPr algn="l">
+              <a:lnSpc>
+                <a:spcPct val="110000"/>
+              </a:lnSpc>
+            </a:pPr>
             <a:r>
               <a:rPr lang="pt-PT" dirty="0"/>
               <a:t>	Documentação do projeto em geral</a:t>
             </a:r>
           </a:p>
           <a:p>
-            <a:pPr algn="l"/>
+            <a:pPr algn="l">
+              <a:lnSpc>
+                <a:spcPct val="110000"/>
+              </a:lnSpc>
+            </a:pPr>
             <a:r>
               <a:rPr lang="pt-PT" dirty="0"/>
               <a:t>	Teste da aplicação num ambiente profissional</a:t>
@@ -4040,7 +4074,7 @@
         </p:nvSpPr>
         <p:spPr>
           <a:xfrm>
-            <a:off x="217997" y="1029154"/>
+            <a:off x="217997" y="1441530"/>
             <a:ext cx="10493546" cy="1655762"/>
           </a:xfrm>
         </p:spPr>
@@ -4050,21 +4084,39 @@
           </a:bodyPr>
           <a:lstStyle/>
           <a:p>
-            <a:pPr algn="l"/>
+            <a:pPr marL="342900" indent="-342900" algn="l">
+              <a:lnSpc>
+                <a:spcPct val="100000"/>
+              </a:lnSpc>
+              <a:buFont typeface="Arial" panose="020B0604020202020204" pitchFamily="34" charset="0"/>
+              <a:buChar char="•"/>
+            </a:pPr>
             <a:r>
               <a:rPr lang="pt-PT" dirty="0"/>
               <a:t>Facilidade e eficiência na visualização e criação dos dados (UX)</a:t>
             </a:r>
           </a:p>
           <a:p>
-            <a:pPr algn="l"/>
+            <a:pPr marL="342900" indent="-342900" algn="l">
+              <a:lnSpc>
+                <a:spcPct val="100000"/>
+              </a:lnSpc>
+              <a:buFont typeface="Arial" panose="020B0604020202020204" pitchFamily="34" charset="0"/>
+              <a:buChar char="•"/>
+            </a:pPr>
             <a:r>
               <a:rPr lang="pt-PT" dirty="0"/>
               <a:t>Interação de membros do clube sem intervenção imediata dos administradores</a:t>
             </a:r>
           </a:p>
           <a:p>
-            <a:pPr algn="l"/>
+            <a:pPr marL="342900" indent="-342900" algn="l">
+              <a:lnSpc>
+                <a:spcPct val="100000"/>
+              </a:lnSpc>
+              <a:buFont typeface="Arial" panose="020B0604020202020204" pitchFamily="34" charset="0"/>
+              <a:buChar char="•"/>
+            </a:pPr>
             <a:r>
               <a:rPr lang="pt-PT" dirty="0"/>
               <a:t>Certificado de associação ao clube</a:t>
@@ -4202,7 +4254,7 @@
         </p:nvSpPr>
         <p:spPr>
           <a:xfrm>
-            <a:off x="217996" y="1060790"/>
+            <a:off x="217997" y="1302837"/>
             <a:ext cx="10464517" cy="4736420"/>
           </a:xfrm>
         </p:spPr>
@@ -4212,56 +4264,104 @@
           </a:bodyPr>
           <a:lstStyle/>
           <a:p>
-            <a:pPr algn="l"/>
+            <a:pPr marL="342900" indent="-342900" algn="l">
+              <a:lnSpc>
+                <a:spcPct val="100000"/>
+              </a:lnSpc>
+              <a:buFont typeface="Arial" panose="020B0604020202020204" pitchFamily="34" charset="0"/>
+              <a:buChar char="•"/>
+            </a:pPr>
             <a:r>
               <a:rPr lang="pt-PT" dirty="0"/>
               <a:t>Criação de membros, candidaturas, quotas, eventos, desportos</a:t>
             </a:r>
           </a:p>
           <a:p>
-            <a:pPr algn="l"/>
+            <a:pPr marL="342900" indent="-342900" algn="l">
+              <a:lnSpc>
+                <a:spcPct val="100000"/>
+              </a:lnSpc>
+              <a:buFont typeface="Arial" panose="020B0604020202020204" pitchFamily="34" charset="0"/>
+              <a:buChar char="•"/>
+            </a:pPr>
             <a:r>
               <a:rPr lang="pt-PT" dirty="0"/>
               <a:t>	Respetivas atualizações</a:t>
             </a:r>
           </a:p>
           <a:p>
-            <a:pPr algn="l"/>
+            <a:pPr marL="342900" indent="-342900" algn="l">
+              <a:lnSpc>
+                <a:spcPct val="100000"/>
+              </a:lnSpc>
+              <a:buFont typeface="Arial" panose="020B0604020202020204" pitchFamily="34" charset="0"/>
+              <a:buChar char="•"/>
+            </a:pPr>
             <a:r>
               <a:rPr lang="pt-PT" dirty="0"/>
               <a:t>Associação dos membros atletas presentes na federação e os seus respetivos desportos</a:t>
             </a:r>
           </a:p>
           <a:p>
-            <a:pPr algn="l"/>
+            <a:pPr marL="342900" indent="-342900" algn="l">
+              <a:lnSpc>
+                <a:spcPct val="100000"/>
+              </a:lnSpc>
+              <a:buFont typeface="Arial" panose="020B0604020202020204" pitchFamily="34" charset="0"/>
+              <a:buChar char="•"/>
+            </a:pPr>
             <a:r>
               <a:rPr lang="pt-PT" dirty="0"/>
               <a:t>Criação de um cartão de membro digital</a:t>
             </a:r>
           </a:p>
           <a:p>
-            <a:pPr algn="l"/>
+            <a:pPr marL="342900" indent="-342900" algn="l">
+              <a:lnSpc>
+                <a:spcPct val="100000"/>
+              </a:lnSpc>
+              <a:buFont typeface="Arial" panose="020B0604020202020204" pitchFamily="34" charset="0"/>
+              <a:buChar char="•"/>
+            </a:pPr>
             <a:r>
               <a:rPr lang="pt-PT" dirty="0"/>
               <a:t>	Permite obtenção de descontos em determinadas empresas parceiras.</a:t>
             </a:r>
           </a:p>
           <a:p>
-            <a:pPr algn="l"/>
+            <a:pPr marL="342900" indent="-342900" algn="l">
+              <a:lnSpc>
+                <a:spcPct val="100000"/>
+              </a:lnSpc>
+              <a:buFont typeface="Arial" panose="020B0604020202020204" pitchFamily="34" charset="0"/>
+              <a:buChar char="•"/>
+            </a:pPr>
             <a:r>
               <a:rPr lang="pt-PT" dirty="0"/>
               <a:t>Notificações por email de novos eventos e aprovação de candidatura</a:t>
             </a:r>
           </a:p>
           <a:p>
-            <a:pPr algn="l"/>
+            <a:pPr marL="342900" indent="-342900" algn="l">
+              <a:lnSpc>
+                <a:spcPct val="100000"/>
+              </a:lnSpc>
+              <a:buFont typeface="Arial" panose="020B0604020202020204" pitchFamily="34" charset="0"/>
+              <a:buChar char="•"/>
+            </a:pPr>
             <a:r>
               <a:rPr lang="pt-PT" dirty="0"/>
               <a:t>Análise de dados para fins estatísticos</a:t>
             </a:r>
           </a:p>
           <a:p>
-            <a:pPr algn="l"/>
+            <a:pPr marL="342900" indent="-342900" algn="l">
+              <a:lnSpc>
+                <a:spcPct val="100000"/>
+              </a:lnSpc>
+              <a:buFont typeface="Arial" panose="020B0604020202020204" pitchFamily="34" charset="0"/>
+              <a:buChar char="•"/>
+            </a:pPr>
             <a:r>
               <a:rPr lang="pt-PT" dirty="0"/>
               <a:t>Contactar administração através da aplicação</a:t>
@@ -4583,6 +4683,53 @@
           </a:p>
         </p:txBody>
       </p:sp>
+      <p:pic>
+        <p:nvPicPr>
+          <p:cNvPr id="1026" name="Picture 2">
+            <a:extLst>
+              <a:ext uri="{FF2B5EF4-FFF2-40B4-BE49-F238E27FC236}">
+                <a16:creationId xmlns:a16="http://schemas.microsoft.com/office/drawing/2014/main" id="{707697EA-9C7C-00B0-DCAB-8274725A7AC3}"/>
+              </a:ext>
+            </a:extLst>
+          </p:cNvPr>
+          <p:cNvPicPr>
+            <a:picLocks noChangeAspect="1" noChangeArrowheads="1"/>
+          </p:cNvPicPr>
+          <p:nvPr/>
+        </p:nvPicPr>
+        <p:blipFill>
+          <a:blip r:embed="rId4">
+            <a:extLst>
+              <a:ext uri="{28A0092B-C50C-407E-A947-70E740481C1C}">
+                <a14:useLocalDpi xmlns:a14="http://schemas.microsoft.com/office/drawing/2010/main" val="0"/>
+              </a:ext>
+            </a:extLst>
+          </a:blip>
+          <a:srcRect/>
+          <a:stretch>
+            <a:fillRect/>
+          </a:stretch>
+        </p:blipFill>
+        <p:spPr bwMode="auto">
+          <a:xfrm>
+            <a:off x="1376362" y="1440237"/>
+            <a:ext cx="9439275" cy="4676775"/>
+          </a:xfrm>
+          <a:prstGeom prst="rect">
+            <a:avLst/>
+          </a:prstGeom>
+          <a:noFill/>
+          <a:extLst>
+            <a:ext uri="{909E8E84-426E-40DD-AFC4-6F175D3DCCD1}">
+              <a14:hiddenFill xmlns:a14="http://schemas.microsoft.com/office/drawing/2010/main">
+                <a:solidFill>
+                  <a:srgbClr val="FFFFFF"/>
+                </a:solidFill>
+              </a14:hiddenFill>
+            </a:ext>
+          </a:extLst>
+        </p:spPr>
+      </p:pic>
     </p:spTree>
     <p:extLst>
       <p:ext uri="{BB962C8B-B14F-4D97-AF65-F5344CB8AC3E}">
@@ -4713,31 +4860,49 @@
         </p:nvSpPr>
         <p:spPr>
           <a:xfrm>
-            <a:off x="217997" y="1236209"/>
+            <a:off x="217997" y="1424468"/>
             <a:ext cx="9144000" cy="1655762"/>
           </a:xfrm>
         </p:spPr>
         <p:txBody>
           <a:bodyPr>
-            <a:normAutofit fontScale="77500" lnSpcReduction="20000"/>
+            <a:noAutofit/>
           </a:bodyPr>
           <a:lstStyle/>
           <a:p>
-            <a:pPr algn="l"/>
+            <a:pPr marL="342900" indent="-342900" algn="l">
+              <a:lnSpc>
+                <a:spcPct val="100000"/>
+              </a:lnSpc>
+              <a:buFont typeface="Arial" panose="020B0604020202020204" pitchFamily="34" charset="0"/>
+              <a:buChar char="•"/>
+            </a:pPr>
             <a:r>
               <a:rPr lang="pt-PT" dirty="0"/>
               <a:t>Abrangente a todos os clientes</a:t>
             </a:r>
           </a:p>
           <a:p>
-            <a:pPr algn="l"/>
+            <a:pPr marL="342900" indent="-342900" algn="l">
+              <a:lnSpc>
+                <a:spcPct val="100000"/>
+              </a:lnSpc>
+              <a:buFont typeface="Arial" panose="020B0604020202020204" pitchFamily="34" charset="0"/>
+              <a:buChar char="•"/>
+            </a:pPr>
             <a:r>
               <a:rPr lang="pt-PT" dirty="0"/>
               <a:t>Implementação da lógica e acesso a dados</a:t>
             </a:r>
           </a:p>
           <a:p>
-            <a:pPr algn="l"/>
+            <a:pPr marL="342900" indent="-342900" algn="l">
+              <a:lnSpc>
+                <a:spcPct val="100000"/>
+              </a:lnSpc>
+              <a:buFont typeface="Arial" panose="020B0604020202020204" pitchFamily="34" charset="0"/>
+              <a:buChar char="•"/>
+            </a:pPr>
             <a:r>
               <a:rPr lang="pt-PT" dirty="0"/>
               <a:t>Utilização da </a:t>
@@ -4760,7 +4925,13 @@
             </a:r>
           </a:p>
           <a:p>
-            <a:pPr algn="l"/>
+            <a:pPr marL="342900" indent="-342900" algn="l">
+              <a:lnSpc>
+                <a:spcPct val="100000"/>
+              </a:lnSpc>
+              <a:buFont typeface="Arial" panose="020B0604020202020204" pitchFamily="34" charset="0"/>
+              <a:buChar char="•"/>
+            </a:pPr>
             <a:r>
               <a:rPr lang="pt-PT" dirty="0"/>
               <a:t>Utilização de </a:t>
@@ -4775,7 +4946,13 @@
             </a:r>
           </a:p>
           <a:p>
-            <a:pPr algn="l"/>
+            <a:pPr marL="342900" indent="-342900" algn="l">
+              <a:lnSpc>
+                <a:spcPct val="100000"/>
+              </a:lnSpc>
+              <a:buFont typeface="Arial" panose="020B0604020202020204" pitchFamily="34" charset="0"/>
+              <a:buChar char="•"/>
+            </a:pPr>
             <a:r>
               <a:rPr lang="pt-PT" dirty="0"/>
               <a:t>Contém um estrutura modular para que a adição de novas funcionalidades seja simples</a:t>
@@ -4913,24 +5090,94 @@
         </p:nvSpPr>
         <p:spPr>
           <a:xfrm>
-            <a:off x="1524000" y="1976438"/>
-            <a:ext cx="9144000" cy="1655762"/>
+            <a:off x="217997" y="1416423"/>
+            <a:ext cx="11756006" cy="4697506"/>
           </a:xfrm>
         </p:spPr>
         <p:txBody>
           <a:bodyPr/>
           <a:lstStyle/>
           <a:p>
-            <a:r>
-              <a:rPr lang="pt-PT" dirty="0"/>
-              <a:t>Dificuldade </a:t>
-            </a:r>
-          </a:p>
-          <a:p>
-            <a:r>
-              <a:rPr lang="pt-PT" dirty="0"/>
-              <a:t>Facilitar a gestão dos membros</a:t>
-            </a:r>
+            <a:pPr marL="342900" indent="-342900" algn="l">
+              <a:lnSpc>
+                <a:spcPct val="100000"/>
+              </a:lnSpc>
+              <a:buFont typeface="Arial" panose="020B0604020202020204" pitchFamily="34" charset="0"/>
+              <a:buChar char="•"/>
+            </a:pPr>
+            <a:r>
+              <a:rPr lang="pt-PT" dirty="0"/>
+              <a:t>Realizado com o middleware PassportJs</a:t>
+            </a:r>
+          </a:p>
+          <a:p>
+            <a:pPr marL="342900" indent="-342900" algn="l">
+              <a:lnSpc>
+                <a:spcPct val="100000"/>
+              </a:lnSpc>
+              <a:buFont typeface="Arial" panose="020B0604020202020204" pitchFamily="34" charset="0"/>
+              <a:buChar char="•"/>
+            </a:pPr>
+            <a:r>
+              <a:rPr lang="pt-PT" dirty="0"/>
+              <a:t>Implementada uma estratégia local com username e password</a:t>
+            </a:r>
+          </a:p>
+          <a:p>
+            <a:pPr marL="342900" indent="-342900" algn="l">
+              <a:lnSpc>
+                <a:spcPct val="100000"/>
+              </a:lnSpc>
+              <a:buFont typeface="Arial" panose="020B0604020202020204" pitchFamily="34" charset="0"/>
+              <a:buChar char="•"/>
+            </a:pPr>
+            <a:r>
+              <a:rPr lang="pt-PT" dirty="0"/>
+              <a:t>Autenticação guardada na session</a:t>
+            </a:r>
+          </a:p>
+          <a:p>
+            <a:pPr marL="342900" indent="-342900" algn="l">
+              <a:lnSpc>
+                <a:spcPct val="100000"/>
+              </a:lnSpc>
+              <a:buFont typeface="Arial" panose="020B0604020202020204" pitchFamily="34" charset="0"/>
+              <a:buChar char="•"/>
+            </a:pPr>
+            <a:r>
+              <a:rPr lang="pt-PT" dirty="0"/>
+              <a:t>Diferentes utilizadores têm diferentes autorizacões</a:t>
+            </a:r>
+          </a:p>
+          <a:p>
+            <a:pPr marL="342900" indent="-342900" algn="l">
+              <a:lnSpc>
+                <a:spcPct val="100000"/>
+              </a:lnSpc>
+              <a:buFont typeface="Arial" panose="020B0604020202020204" pitchFamily="34" charset="0"/>
+              <a:buChar char="•"/>
+            </a:pPr>
+            <a:r>
+              <a:rPr lang="pt-PT" dirty="0"/>
+              <a:t>Admins têm permissão para visualizar todas as páginas e alterar o counteúdo de algumas</a:t>
+            </a:r>
+          </a:p>
+          <a:p>
+            <a:pPr marL="342900" indent="-342900" algn="l">
+              <a:lnSpc>
+                <a:spcPct val="100000"/>
+              </a:lnSpc>
+              <a:buFont typeface="Arial" panose="020B0604020202020204" pitchFamily="34" charset="0"/>
+              <a:buChar char="•"/>
+            </a:pPr>
+            <a:r>
+              <a:rPr lang="pt-PT" dirty="0"/>
+              <a:t>Membros normais, podem ver os diferentes desportos e visualizar/editar o seu próprio perfil</a:t>
+            </a:r>
+          </a:p>
+          <a:p>
+            <a:pPr algn="l"/>
+            <a:endParaRPr lang="pt-PT" dirty="0"/>
           </a:p>
         </p:txBody>
       </p:sp>
@@ -5064,7 +5311,7 @@
         </p:nvSpPr>
         <p:spPr>
           <a:xfrm>
-            <a:off x="217997" y="1029153"/>
+            <a:off x="217997" y="1199404"/>
             <a:ext cx="9144000" cy="5683703"/>
           </a:xfrm>
         </p:spPr>
@@ -5074,7 +5321,10 @@
           </a:bodyPr>
           <a:lstStyle/>
           <a:p>
-            <a:pPr algn="l"/>
+            <a:pPr marL="342900" indent="-342900" algn="l">
+              <a:buFont typeface="Arial" panose="020B0604020202020204" pitchFamily="34" charset="0"/>
+              <a:buChar char="•"/>
+            </a:pPr>
             <a:r>
               <a:rPr lang="pt-PT" dirty="0"/>
               <a:t>Aplicação híbrida</a:t>
@@ -5146,11 +5396,17 @@
             </a:r>
           </a:p>
           <a:p>
-            <a:pPr algn="l"/>
+            <a:pPr marL="342900" indent="-342900" algn="l">
+              <a:buFont typeface="Arial" panose="020B0604020202020204" pitchFamily="34" charset="0"/>
+              <a:buChar char="•"/>
+            </a:pPr>
             <a:endParaRPr lang="pt-PT" dirty="0"/>
           </a:p>
           <a:p>
-            <a:pPr algn="l"/>
+            <a:pPr marL="342900" indent="-342900" algn="l">
+              <a:buFont typeface="Arial" panose="020B0604020202020204" pitchFamily="34" charset="0"/>
+              <a:buChar char="•"/>
+            </a:pPr>
             <a:r>
               <a:rPr lang="pt-PT" dirty="0"/>
               <a:t>Desenvolvido com </a:t>
@@ -5162,11 +5418,17 @@
             <a:endParaRPr lang="pt-PT" dirty="0"/>
           </a:p>
           <a:p>
-            <a:pPr algn="l"/>
+            <a:pPr marL="342900" indent="-342900" algn="l">
+              <a:buFont typeface="Arial" panose="020B0604020202020204" pitchFamily="34" charset="0"/>
+              <a:buChar char="•"/>
+            </a:pPr>
             <a:endParaRPr lang="pt-PT" dirty="0"/>
           </a:p>
           <a:p>
-            <a:pPr algn="l"/>
+            <a:pPr marL="342900" indent="-342900" algn="l">
+              <a:buFont typeface="Arial" panose="020B0604020202020204" pitchFamily="34" charset="0"/>
+              <a:buChar char="•"/>
+            </a:pPr>
             <a:r>
               <a:rPr lang="pt-PT" dirty="0" err="1"/>
               <a:t>Routeamento</a:t>
@@ -5192,22 +5454,34 @@
             </a:r>
           </a:p>
           <a:p>
-            <a:pPr algn="l"/>
+            <a:pPr marL="342900" indent="-342900" algn="l">
+              <a:buFont typeface="Arial" panose="020B0604020202020204" pitchFamily="34" charset="0"/>
+              <a:buChar char="•"/>
+            </a:pPr>
             <a:endParaRPr lang="pt-PT" dirty="0"/>
           </a:p>
           <a:p>
-            <a:pPr algn="l"/>
+            <a:pPr marL="342900" indent="-342900" algn="l">
+              <a:buFont typeface="Arial" panose="020B0604020202020204" pitchFamily="34" charset="0"/>
+              <a:buChar char="•"/>
+            </a:pPr>
             <a:r>
               <a:rPr lang="pt-PT" dirty="0"/>
               <a:t>Servidor distinto da aplicação servidora</a:t>
             </a:r>
           </a:p>
           <a:p>
-            <a:pPr algn="l"/>
+            <a:pPr marL="342900" indent="-342900" algn="l">
+              <a:buFont typeface="Arial" panose="020B0604020202020204" pitchFamily="34" charset="0"/>
+              <a:buChar char="•"/>
+            </a:pPr>
             <a:endParaRPr lang="pt-PT" dirty="0"/>
           </a:p>
           <a:p>
-            <a:pPr algn="l"/>
+            <a:pPr marL="342900" indent="-342900" algn="l">
+              <a:buFont typeface="Arial" panose="020B0604020202020204" pitchFamily="34" charset="0"/>
+              <a:buChar char="•"/>
+            </a:pPr>
             <a:r>
               <a:rPr lang="pt-PT" dirty="0"/>
               <a:t>Aplicação responsiva</a:t>

</xml_diff>

<commit_message>
changed image in progress presentation
</commit_message>
<xml_diff>
--- a/docs/demonstracao-progresso.pptx
+++ b/docs/demonstracao-progresso.pptx
@@ -13837,15 +13837,15 @@
       </p:sp>
       <p:pic>
         <p:nvPicPr>
-          <p:cNvPr id="11" name="Picture 2">
+          <p:cNvPr id="15" name="Imagem 14">
             <a:extLst>
               <a:ext uri="{FF2B5EF4-FFF2-40B4-BE49-F238E27FC236}">
-                <a16:creationId xmlns:a16="http://schemas.microsoft.com/office/drawing/2014/main" id="{824B7F5E-4983-96B4-5E2C-5A54B18AF14E}"/>
+                <a16:creationId xmlns:a16="http://schemas.microsoft.com/office/drawing/2014/main" id="{5E3DE74F-5B2C-64F3-CCF2-D67C560CA1D6}"/>
               </a:ext>
             </a:extLst>
           </p:cNvPr>
           <p:cNvPicPr>
-            <a:picLocks noChangeAspect="1" noChangeArrowheads="1"/>
+            <a:picLocks noChangeAspect="1"/>
           </p:cNvPicPr>
           <p:nvPr/>
         </p:nvPicPr>
@@ -13857,29 +13857,18 @@
               </a:ext>
             </a:extLst>
           </a:blip>
-          <a:srcRect/>
           <a:stretch>
             <a:fillRect/>
           </a:stretch>
         </p:blipFill>
-        <p:spPr bwMode="auto">
+        <p:spPr>
           <a:xfrm>
-            <a:off x="1509394" y="1256732"/>
-            <a:ext cx="9439275" cy="4676775"/>
+            <a:off x="1697174" y="1400513"/>
+            <a:ext cx="8797651" cy="4358877"/>
           </a:xfrm>
           <a:prstGeom prst="rect">
             <a:avLst/>
           </a:prstGeom>
-          <a:noFill/>
-          <a:extLst>
-            <a:ext uri="{909E8E84-426E-40DD-AFC4-6F175D3DCCD1}">
-              <a14:hiddenFill xmlns:a14="http://schemas.microsoft.com/office/drawing/2010/main">
-                <a:solidFill>
-                  <a:srgbClr val="FFFFFF"/>
-                </a:solidFill>
-              </a14:hiddenFill>
-            </a:ext>
-          </a:extLst>
         </p:spPr>
       </p:pic>
     </p:spTree>

</xml_diff>